<commit_message>
added ppt and image
</commit_message>
<xml_diff>
--- a/raytrace_resource/raytracing_picks.pptx
+++ b/raytrace_resource/raytracing_picks.pptx
@@ -3612,6 +3612,30 @@
           <a:chExt cx="0" cy="0"/>
         </a:xfrm>
       </p:grpSpPr>
+      <p:pic>
+        <p:nvPicPr>
+          <p:cNvPr id="2" name="Picture 1"/>
+          <p:cNvPicPr>
+            <a:picLocks noChangeAspect="1"/>
+          </p:cNvPicPr>
+          <p:nvPr/>
+        </p:nvPicPr>
+        <p:blipFill>
+          <a:blip r:embed="rId2"/>
+          <a:stretch>
+            <a:fillRect/>
+          </a:stretch>
+        </p:blipFill>
+        <p:spPr>
+          <a:xfrm>
+            <a:off x="442686" y="591684"/>
+            <a:ext cx="9402252" cy="5489802"/>
+          </a:xfrm>
+          <a:prstGeom prst="rect">
+            <a:avLst/>
+          </a:prstGeom>
+        </p:spPr>
+      </p:pic>
     </p:spTree>
     <p:extLst>
       <p:ext uri="{BB962C8B-B14F-4D97-AF65-F5344CB8AC3E}">

</xml_diff>